<commit_message>
updated Figure 2 with white background instead of grey background
</commit_message>
<xml_diff>
--- a/figures/Fig2_example_allocation_flowcharts.pptx
+++ b/figures/Fig2_example_allocation_flowcharts.pptx
@@ -7492,7 +7492,7 @@
           <a:p>
             <a:fld id="{9F507B8A-E3BB-0145-809A-24F4FFE44A13}" type="datetimeFigureOut">
               <a:rPr lang="en-US" smtClean="0"/>
-              <a:t>2/28/25</a:t>
+              <a:t>5/28/25</a:t>
             </a:fld>
             <a:endParaRPr lang="en-US"/>
           </a:p>
@@ -8324,7 +8324,7 @@
           <a:p>
             <a:fld id="{54403F41-106F-344B-BE8F-16378C53746D}" type="datetimeFigureOut">
               <a:rPr lang="en-US" smtClean="0"/>
-              <a:t>2/28/25</a:t>
+              <a:t>5/28/25</a:t>
             </a:fld>
             <a:endParaRPr lang="en-US"/>
           </a:p>
@@ -8494,7 +8494,7 @@
           <a:p>
             <a:fld id="{54403F41-106F-344B-BE8F-16378C53746D}" type="datetimeFigureOut">
               <a:rPr lang="en-US" smtClean="0"/>
-              <a:t>2/28/25</a:t>
+              <a:t>5/28/25</a:t>
             </a:fld>
             <a:endParaRPr lang="en-US"/>
           </a:p>
@@ -8674,7 +8674,7 @@
           <a:p>
             <a:fld id="{54403F41-106F-344B-BE8F-16378C53746D}" type="datetimeFigureOut">
               <a:rPr lang="en-US" smtClean="0"/>
-              <a:t>2/28/25</a:t>
+              <a:t>5/28/25</a:t>
             </a:fld>
             <a:endParaRPr lang="en-US"/>
           </a:p>
@@ -8844,7 +8844,7 @@
           <a:p>
             <a:fld id="{54403F41-106F-344B-BE8F-16378C53746D}" type="datetimeFigureOut">
               <a:rPr lang="en-US" smtClean="0"/>
-              <a:t>2/28/25</a:t>
+              <a:t>5/28/25</a:t>
             </a:fld>
             <a:endParaRPr lang="en-US"/>
           </a:p>
@@ -9088,7 +9088,7 @@
           <a:p>
             <a:fld id="{54403F41-106F-344B-BE8F-16378C53746D}" type="datetimeFigureOut">
               <a:rPr lang="en-US" smtClean="0"/>
-              <a:t>2/28/25</a:t>
+              <a:t>5/28/25</a:t>
             </a:fld>
             <a:endParaRPr lang="en-US"/>
           </a:p>
@@ -9320,7 +9320,7 @@
           <a:p>
             <a:fld id="{54403F41-106F-344B-BE8F-16378C53746D}" type="datetimeFigureOut">
               <a:rPr lang="en-US" smtClean="0"/>
-              <a:t>2/28/25</a:t>
+              <a:t>5/28/25</a:t>
             </a:fld>
             <a:endParaRPr lang="en-US"/>
           </a:p>
@@ -9687,7 +9687,7 @@
           <a:p>
             <a:fld id="{54403F41-106F-344B-BE8F-16378C53746D}" type="datetimeFigureOut">
               <a:rPr lang="en-US" smtClean="0"/>
-              <a:t>2/28/25</a:t>
+              <a:t>5/28/25</a:t>
             </a:fld>
             <a:endParaRPr lang="en-US"/>
           </a:p>
@@ -9805,7 +9805,7 @@
           <a:p>
             <a:fld id="{54403F41-106F-344B-BE8F-16378C53746D}" type="datetimeFigureOut">
               <a:rPr lang="en-US" smtClean="0"/>
-              <a:t>2/28/25</a:t>
+              <a:t>5/28/25</a:t>
             </a:fld>
             <a:endParaRPr lang="en-US"/>
           </a:p>
@@ -9900,7 +9900,7 @@
           <a:p>
             <a:fld id="{54403F41-106F-344B-BE8F-16378C53746D}" type="datetimeFigureOut">
               <a:rPr lang="en-US" smtClean="0"/>
-              <a:t>2/28/25</a:t>
+              <a:t>5/28/25</a:t>
             </a:fld>
             <a:endParaRPr lang="en-US"/>
           </a:p>
@@ -10177,7 +10177,7 @@
           <a:p>
             <a:fld id="{54403F41-106F-344B-BE8F-16378C53746D}" type="datetimeFigureOut">
               <a:rPr lang="en-US" smtClean="0"/>
-              <a:t>2/28/25</a:t>
+              <a:t>5/28/25</a:t>
             </a:fld>
             <a:endParaRPr lang="en-US"/>
           </a:p>
@@ -10434,7 +10434,7 @@
           <a:p>
             <a:fld id="{54403F41-106F-344B-BE8F-16378C53746D}" type="datetimeFigureOut">
               <a:rPr lang="en-US" smtClean="0"/>
-              <a:t>2/28/25</a:t>
+              <a:t>5/28/25</a:t>
             </a:fld>
             <a:endParaRPr lang="en-US"/>
           </a:p>
@@ -10647,7 +10647,7 @@
           <a:p>
             <a:fld id="{54403F41-106F-344B-BE8F-16378C53746D}" type="datetimeFigureOut">
               <a:rPr lang="en-US" smtClean="0"/>
-              <a:t>2/28/25</a:t>
+              <a:t>5/28/25</a:t>
             </a:fld>
             <a:endParaRPr lang="en-US"/>
           </a:p>
@@ -18211,61 +18211,6 @@
           <a:chExt cx="0" cy="0"/>
         </a:xfrm>
       </p:grpSpPr>
-      <p:sp>
-        <p:nvSpPr>
-          <p:cNvPr id="11" name="Rectangle 10">
-            <a:extLst>
-              <a:ext uri="{FF2B5EF4-FFF2-40B4-BE49-F238E27FC236}">
-                <a16:creationId xmlns:a16="http://schemas.microsoft.com/office/drawing/2014/main" id="{6FD25897-E6F7-5389-054E-70652D9EF559}"/>
-              </a:ext>
-            </a:extLst>
-          </p:cNvPr>
-          <p:cNvSpPr/>
-          <p:nvPr/>
-        </p:nvSpPr>
-        <p:spPr>
-          <a:xfrm>
-            <a:off x="-36089" y="0"/>
-            <a:ext cx="7808490" cy="10308772"/>
-          </a:xfrm>
-          <a:prstGeom prst="rect">
-            <a:avLst/>
-          </a:prstGeom>
-          <a:solidFill>
-            <a:srgbClr val="EEEEEE"/>
-          </a:solidFill>
-          <a:ln>
-            <a:noFill/>
-          </a:ln>
-        </p:spPr>
-        <p:style>
-          <a:lnRef idx="2">
-            <a:schemeClr val="accent1">
-              <a:shade val="15000"/>
-            </a:schemeClr>
-          </a:lnRef>
-          <a:fillRef idx="1">
-            <a:schemeClr val="accent1"/>
-          </a:fillRef>
-          <a:effectRef idx="0">
-            <a:schemeClr val="accent1"/>
-          </a:effectRef>
-          <a:fontRef idx="minor">
-            <a:schemeClr val="lt1"/>
-          </a:fontRef>
-        </p:style>
-        <p:txBody>
-          <a:bodyPr rtlCol="0" anchor="ctr"/>
-          <a:lstStyle/>
-          <a:p>
-            <a:pPr algn="ctr"/>
-            <a:endParaRPr lang="en-US">
-              <a:latin typeface="Arial" panose="020B0604020202020204" pitchFamily="34" charset="0"/>
-              <a:cs typeface="Arial" panose="020B0604020202020204" pitchFamily="34" charset="0"/>
-            </a:endParaRPr>
-          </a:p>
-        </p:txBody>
-      </p:sp>
       <p:grpSp>
         <p:nvGrpSpPr>
           <p:cNvPr id="2" name="Group 1">
@@ -24915,61 +24860,6 @@
           <a:chExt cx="0" cy="0"/>
         </a:xfrm>
       </p:grpSpPr>
-      <p:sp>
-        <p:nvSpPr>
-          <p:cNvPr id="11" name="Rectangle 10">
-            <a:extLst>
-              <a:ext uri="{FF2B5EF4-FFF2-40B4-BE49-F238E27FC236}">
-                <a16:creationId xmlns:a16="http://schemas.microsoft.com/office/drawing/2014/main" id="{0CC2C693-3F6B-4F7B-B3B8-2591D44523B2}"/>
-              </a:ext>
-            </a:extLst>
-          </p:cNvPr>
-          <p:cNvSpPr/>
-          <p:nvPr/>
-        </p:nvSpPr>
-        <p:spPr>
-          <a:xfrm>
-            <a:off x="-36089" y="0"/>
-            <a:ext cx="7808490" cy="10308772"/>
-          </a:xfrm>
-          <a:prstGeom prst="rect">
-            <a:avLst/>
-          </a:prstGeom>
-          <a:solidFill>
-            <a:srgbClr val="EEEEEE"/>
-          </a:solidFill>
-          <a:ln>
-            <a:noFill/>
-          </a:ln>
-        </p:spPr>
-        <p:style>
-          <a:lnRef idx="2">
-            <a:schemeClr val="accent1">
-              <a:shade val="15000"/>
-            </a:schemeClr>
-          </a:lnRef>
-          <a:fillRef idx="1">
-            <a:schemeClr val="accent1"/>
-          </a:fillRef>
-          <a:effectRef idx="0">
-            <a:schemeClr val="accent1"/>
-          </a:effectRef>
-          <a:fontRef idx="minor">
-            <a:schemeClr val="lt1"/>
-          </a:fontRef>
-        </p:style>
-        <p:txBody>
-          <a:bodyPr rtlCol="0" anchor="ctr"/>
-          <a:lstStyle/>
-          <a:p>
-            <a:pPr algn="ctr"/>
-            <a:endParaRPr lang="en-US">
-              <a:latin typeface="Arial" panose="020B0604020202020204" pitchFamily="34" charset="0"/>
-              <a:cs typeface="Arial" panose="020B0604020202020204" pitchFamily="34" charset="0"/>
-            </a:endParaRPr>
-          </a:p>
-        </p:txBody>
-      </p:sp>
       <p:grpSp>
         <p:nvGrpSpPr>
           <p:cNvPr id="2" name="Group 1">

</xml_diff>